<commit_message>
Se empieza a afinar MeanShift
</commit_message>
<xml_diff>
--- a/Resultados preliminares.pptx
+++ b/Resultados preliminares.pptx
@@ -10,9 +10,10 @@
     <p:sldId id="258" r:id="rId4"/>
     <p:sldId id="267" r:id="rId5"/>
     <p:sldId id="263" r:id="rId6"/>
-    <p:sldId id="264" r:id="rId7"/>
-    <p:sldId id="268" r:id="rId8"/>
-    <p:sldId id="266" r:id="rId9"/>
+    <p:sldId id="269" r:id="rId7"/>
+    <p:sldId id="264" r:id="rId8"/>
+    <p:sldId id="268" r:id="rId9"/>
+    <p:sldId id="266" r:id="rId10"/>
   </p:sldIdLst>
   <p:sldSz cx="12192000" cy="6858000"/>
   <p:notesSz cx="6858000" cy="9144000"/>
@@ -268,7 +269,7 @@
           <a:p>
             <a:fld id="{AF078599-6A28-4C8C-815F-7D6AB7FE00BA}" type="datetimeFigureOut">
               <a:rPr lang="es-ES" smtClean="0"/>
-              <a:t>07/03/2023</a:t>
+              <a:t>13/03/2023</a:t>
             </a:fld>
             <a:endParaRPr lang="es-ES"/>
           </a:p>
@@ -468,7 +469,7 @@
           <a:p>
             <a:fld id="{AF078599-6A28-4C8C-815F-7D6AB7FE00BA}" type="datetimeFigureOut">
               <a:rPr lang="es-ES" smtClean="0"/>
-              <a:t>07/03/2023</a:t>
+              <a:t>13/03/2023</a:t>
             </a:fld>
             <a:endParaRPr lang="es-ES"/>
           </a:p>
@@ -678,7 +679,7 @@
           <a:p>
             <a:fld id="{AF078599-6A28-4C8C-815F-7D6AB7FE00BA}" type="datetimeFigureOut">
               <a:rPr lang="es-ES" smtClean="0"/>
-              <a:t>07/03/2023</a:t>
+              <a:t>13/03/2023</a:t>
             </a:fld>
             <a:endParaRPr lang="es-ES"/>
           </a:p>
@@ -878,7 +879,7 @@
           <a:p>
             <a:fld id="{AF078599-6A28-4C8C-815F-7D6AB7FE00BA}" type="datetimeFigureOut">
               <a:rPr lang="es-ES" smtClean="0"/>
-              <a:t>07/03/2023</a:t>
+              <a:t>13/03/2023</a:t>
             </a:fld>
             <a:endParaRPr lang="es-ES"/>
           </a:p>
@@ -1154,7 +1155,7 @@
           <a:p>
             <a:fld id="{AF078599-6A28-4C8C-815F-7D6AB7FE00BA}" type="datetimeFigureOut">
               <a:rPr lang="es-ES" smtClean="0"/>
-              <a:t>07/03/2023</a:t>
+              <a:t>13/03/2023</a:t>
             </a:fld>
             <a:endParaRPr lang="es-ES"/>
           </a:p>
@@ -1422,7 +1423,7 @@
           <a:p>
             <a:fld id="{AF078599-6A28-4C8C-815F-7D6AB7FE00BA}" type="datetimeFigureOut">
               <a:rPr lang="es-ES" smtClean="0"/>
-              <a:t>07/03/2023</a:t>
+              <a:t>13/03/2023</a:t>
             </a:fld>
             <a:endParaRPr lang="es-ES"/>
           </a:p>
@@ -1837,7 +1838,7 @@
           <a:p>
             <a:fld id="{AF078599-6A28-4C8C-815F-7D6AB7FE00BA}" type="datetimeFigureOut">
               <a:rPr lang="es-ES" smtClean="0"/>
-              <a:t>07/03/2023</a:t>
+              <a:t>13/03/2023</a:t>
             </a:fld>
             <a:endParaRPr lang="es-ES"/>
           </a:p>
@@ -1979,7 +1980,7 @@
           <a:p>
             <a:fld id="{AF078599-6A28-4C8C-815F-7D6AB7FE00BA}" type="datetimeFigureOut">
               <a:rPr lang="es-ES" smtClean="0"/>
-              <a:t>07/03/2023</a:t>
+              <a:t>13/03/2023</a:t>
             </a:fld>
             <a:endParaRPr lang="es-ES"/>
           </a:p>
@@ -2092,7 +2093,7 @@
           <a:p>
             <a:fld id="{AF078599-6A28-4C8C-815F-7D6AB7FE00BA}" type="datetimeFigureOut">
               <a:rPr lang="es-ES" smtClean="0"/>
-              <a:t>07/03/2023</a:t>
+              <a:t>13/03/2023</a:t>
             </a:fld>
             <a:endParaRPr lang="es-ES"/>
           </a:p>
@@ -2405,7 +2406,7 @@
           <a:p>
             <a:fld id="{AF078599-6A28-4C8C-815F-7D6AB7FE00BA}" type="datetimeFigureOut">
               <a:rPr lang="es-ES" smtClean="0"/>
-              <a:t>07/03/2023</a:t>
+              <a:t>13/03/2023</a:t>
             </a:fld>
             <a:endParaRPr lang="es-ES"/>
           </a:p>
@@ -2694,7 +2695,7 @@
           <a:p>
             <a:fld id="{AF078599-6A28-4C8C-815F-7D6AB7FE00BA}" type="datetimeFigureOut">
               <a:rPr lang="es-ES" smtClean="0"/>
-              <a:t>07/03/2023</a:t>
+              <a:t>13/03/2023</a:t>
             </a:fld>
             <a:endParaRPr lang="es-ES"/>
           </a:p>
@@ -2937,7 +2938,7 @@
           <a:p>
             <a:fld id="{AF078599-6A28-4C8C-815F-7D6AB7FE00BA}" type="datetimeFigureOut">
               <a:rPr lang="es-ES" smtClean="0"/>
-              <a:t>07/03/2023</a:t>
+              <a:t>13/03/2023</a:t>
             </a:fld>
             <a:endParaRPr lang="es-ES"/>
           </a:p>
@@ -4779,6 +4780,161 @@
           </a:prstGeom>
         </p:spPr>
       </p:pic>
+      <p:sp>
+        <p:nvSpPr>
+          <p:cNvPr id="3" name="Content Placeholder 2">
+            <a:extLst>
+              <a:ext uri="{FF2B5EF4-FFF2-40B4-BE49-F238E27FC236}">
+                <a16:creationId xmlns:a16="http://schemas.microsoft.com/office/drawing/2014/main" id="{59E37850-0E07-F0F9-360B-41C08C4BA198}"/>
+              </a:ext>
+            </a:extLst>
+          </p:cNvPr>
+          <p:cNvSpPr>
+            <a:spLocks noGrp="1"/>
+          </p:cNvSpPr>
+          <p:nvPr>
+            <p:ph idx="1"/>
+          </p:nvPr>
+        </p:nvSpPr>
+        <p:spPr>
+          <a:xfrm>
+            <a:off x="-3176" y="1548499"/>
+            <a:ext cx="12192000" cy="555648"/>
+          </a:xfrm>
+        </p:spPr>
+        <p:txBody>
+          <a:bodyPr vert="horz" lIns="91440" tIns="45720" rIns="91440" bIns="45720" rtlCol="0">
+            <a:normAutofit fontScale="92500"/>
+          </a:bodyPr>
+          <a:lstStyle/>
+          <a:p>
+            <a:pPr marL="0" indent="0" algn="ctr">
+              <a:buNone/>
+            </a:pPr>
+            <a:r>
+              <a:rPr lang="en-US" sz="2000" kern="1200" dirty="0">
+                <a:solidFill>
+                  <a:srgbClr val="84C8D9"/>
+                </a:solidFill>
+                <a:latin typeface="+mn-lt"/>
+                <a:ea typeface="+mn-ea"/>
+                <a:cs typeface="+mn-cs"/>
+              </a:rPr>
+              <a:t>Quantile = 0,01, </a:t>
+            </a:r>
+            <a:r>
+              <a:rPr lang="en-US" sz="2000" kern="1200" dirty="0" err="1">
+                <a:solidFill>
+                  <a:srgbClr val="84C8D9"/>
+                </a:solidFill>
+                <a:latin typeface="+mn-lt"/>
+                <a:ea typeface="+mn-ea"/>
+                <a:cs typeface="+mn-cs"/>
+              </a:rPr>
+              <a:t>n_samples</a:t>
+            </a:r>
+            <a:r>
+              <a:rPr lang="en-US" sz="2000" kern="1200" dirty="0">
+                <a:solidFill>
+                  <a:srgbClr val="84C8D9"/>
+                </a:solidFill>
+                <a:latin typeface="+mn-lt"/>
+                <a:ea typeface="+mn-ea"/>
+                <a:cs typeface="+mn-cs"/>
+              </a:rPr>
+              <a:t> = 299, seed = None, </a:t>
+            </a:r>
+            <a:r>
+              <a:rPr lang="en-US" sz="2000" kern="1200" dirty="0" err="1">
+                <a:solidFill>
+                  <a:srgbClr val="84C8D9"/>
+                </a:solidFill>
+                <a:latin typeface="+mn-lt"/>
+                <a:ea typeface="+mn-ea"/>
+                <a:cs typeface="+mn-cs"/>
+              </a:rPr>
+              <a:t>bin_seeding</a:t>
+            </a:r>
+            <a:r>
+              <a:rPr lang="en-US" sz="2000" kern="1200" dirty="0">
+                <a:solidFill>
+                  <a:srgbClr val="84C8D9"/>
+                </a:solidFill>
+                <a:latin typeface="+mn-lt"/>
+                <a:ea typeface="+mn-ea"/>
+                <a:cs typeface="+mn-cs"/>
+              </a:rPr>
+              <a:t>  = False, </a:t>
+            </a:r>
+            <a:r>
+              <a:rPr lang="en-US" sz="2000" kern="1200" dirty="0" err="1">
+                <a:solidFill>
+                  <a:srgbClr val="84C8D9"/>
+                </a:solidFill>
+                <a:latin typeface="+mn-lt"/>
+                <a:ea typeface="+mn-ea"/>
+                <a:cs typeface="+mn-cs"/>
+              </a:rPr>
+              <a:t>min_bin:freq</a:t>
+            </a:r>
+            <a:r>
+              <a:rPr lang="en-US" sz="2000" kern="1200" dirty="0">
+                <a:solidFill>
+                  <a:srgbClr val="84C8D9"/>
+                </a:solidFill>
+                <a:latin typeface="+mn-lt"/>
+                <a:ea typeface="+mn-ea"/>
+                <a:cs typeface="+mn-cs"/>
+              </a:rPr>
+              <a:t> = 1, </a:t>
+            </a:r>
+            <a:r>
+              <a:rPr lang="en-US" sz="2000" kern="1200" dirty="0" err="1">
+                <a:solidFill>
+                  <a:srgbClr val="84C8D9"/>
+                </a:solidFill>
+                <a:latin typeface="+mn-lt"/>
+                <a:ea typeface="+mn-ea"/>
+                <a:cs typeface="+mn-cs"/>
+              </a:rPr>
+              <a:t>cluster_all</a:t>
+            </a:r>
+            <a:r>
+              <a:rPr lang="en-US" sz="2000" kern="1200" dirty="0">
+                <a:solidFill>
+                  <a:srgbClr val="84C8D9"/>
+                </a:solidFill>
+                <a:latin typeface="+mn-lt"/>
+                <a:ea typeface="+mn-ea"/>
+                <a:cs typeface="+mn-cs"/>
+              </a:rPr>
+              <a:t> = True, </a:t>
+            </a:r>
+            <a:r>
+              <a:rPr lang="en-US" sz="2000" kern="1200" dirty="0" err="1">
+                <a:solidFill>
+                  <a:srgbClr val="84C8D9"/>
+                </a:solidFill>
+                <a:latin typeface="+mn-lt"/>
+                <a:ea typeface="+mn-ea"/>
+                <a:cs typeface="+mn-cs"/>
+              </a:rPr>
+              <a:t>max_iter</a:t>
+            </a:r>
+            <a:r>
+              <a:rPr lang="en-US" sz="2000" kern="1200" dirty="0">
+                <a:solidFill>
+                  <a:srgbClr val="84C8D9"/>
+                </a:solidFill>
+                <a:latin typeface="+mn-lt"/>
+                <a:ea typeface="+mn-ea"/>
+                <a:cs typeface="+mn-cs"/>
+              </a:rPr>
+              <a:t> = 300</a:t>
+            </a:r>
+          </a:p>
+        </p:txBody>
+      </p:sp>
     </p:spTree>
     <p:extLst>
       <p:ext uri="{BB962C8B-B14F-4D97-AF65-F5344CB8AC3E}">
@@ -4976,7 +5132,7 @@
                 <a:ea typeface="+mj-ea"/>
                 <a:cs typeface="+mj-cs"/>
               </a:rPr>
-              <a:t>DBSCAN</a:t>
+              <a:t>Mean Shift </a:t>
             </a:r>
           </a:p>
         </p:txBody>
@@ -5092,19 +5248,17 @@
       </p:cxnSp>
       <p:pic>
         <p:nvPicPr>
-          <p:cNvPr id="11" name="Content Placeholder 10" descr="Graphical user interface, text&#10;&#10;Description automatically generated">
-            <a:extLst>
-              <a:ext uri="{FF2B5EF4-FFF2-40B4-BE49-F238E27FC236}">
-                <a16:creationId xmlns:a16="http://schemas.microsoft.com/office/drawing/2014/main" id="{29176373-59A0-D750-1D29-096ED3DFF72E}"/>
+          <p:cNvPr id="7" name="Picture 6" descr="Graphical user interface, text&#10;&#10;Description automatically generated">
+            <a:extLst>
+              <a:ext uri="{FF2B5EF4-FFF2-40B4-BE49-F238E27FC236}">
+                <a16:creationId xmlns:a16="http://schemas.microsoft.com/office/drawing/2014/main" id="{A4E54670-B1D8-ED32-3255-B05E4812DE19}"/>
               </a:ext>
             </a:extLst>
           </p:cNvPr>
           <p:cNvPicPr>
-            <a:picLocks noGrp="1" noChangeAspect="1"/>
+            <a:picLocks noChangeAspect="1"/>
           </p:cNvPicPr>
-          <p:nvPr>
-            <p:ph idx="1"/>
-          </p:nvPr>
+          <p:nvPr/>
         </p:nvPicPr>
         <p:blipFill>
           <a:blip r:embed="rId2">
@@ -5120,15 +5274,173 @@
         </p:blipFill>
         <p:spPr>
           <a:xfrm>
-            <a:off x="345212" y="2691449"/>
-            <a:ext cx="11498400" cy="3171506"/>
-          </a:xfrm>
+            <a:off x="345212" y="2987525"/>
+            <a:ext cx="11498400" cy="3032250"/>
+          </a:xfrm>
+          <a:prstGeom prst="rect">
+            <a:avLst/>
+          </a:prstGeom>
         </p:spPr>
       </p:pic>
+      <p:sp>
+        <p:nvSpPr>
+          <p:cNvPr id="3" name="Content Placeholder 2">
+            <a:extLst>
+              <a:ext uri="{FF2B5EF4-FFF2-40B4-BE49-F238E27FC236}">
+                <a16:creationId xmlns:a16="http://schemas.microsoft.com/office/drawing/2014/main" id="{59E37850-0E07-F0F9-360B-41C08C4BA198}"/>
+              </a:ext>
+            </a:extLst>
+          </p:cNvPr>
+          <p:cNvSpPr>
+            <a:spLocks noGrp="1"/>
+          </p:cNvSpPr>
+          <p:nvPr>
+            <p:ph idx="1"/>
+          </p:nvPr>
+        </p:nvSpPr>
+        <p:spPr>
+          <a:xfrm>
+            <a:off x="-3176" y="1548499"/>
+            <a:ext cx="12192000" cy="555648"/>
+          </a:xfrm>
+        </p:spPr>
+        <p:txBody>
+          <a:bodyPr vert="horz" lIns="91440" tIns="45720" rIns="91440" bIns="45720" rtlCol="0">
+            <a:normAutofit fontScale="92500"/>
+          </a:bodyPr>
+          <a:lstStyle/>
+          <a:p>
+            <a:pPr marL="0" indent="0" algn="ctr">
+              <a:buNone/>
+            </a:pPr>
+            <a:r>
+              <a:rPr lang="en-US" sz="2000" kern="1200" dirty="0">
+                <a:solidFill>
+                  <a:srgbClr val="84C8D9"/>
+                </a:solidFill>
+                <a:latin typeface="+mn-lt"/>
+                <a:ea typeface="+mn-ea"/>
+                <a:cs typeface="+mn-cs"/>
+              </a:rPr>
+              <a:t>Quantile = 0,01, </a:t>
+            </a:r>
+            <a:r>
+              <a:rPr lang="en-US" sz="2000" kern="1200" dirty="0" err="1">
+                <a:solidFill>
+                  <a:srgbClr val="84C8D9"/>
+                </a:solidFill>
+                <a:latin typeface="+mn-lt"/>
+                <a:ea typeface="+mn-ea"/>
+                <a:cs typeface="+mn-cs"/>
+              </a:rPr>
+              <a:t>n_samples</a:t>
+            </a:r>
+            <a:r>
+              <a:rPr lang="en-US" sz="2000" kern="1200" dirty="0">
+                <a:solidFill>
+                  <a:srgbClr val="84C8D9"/>
+                </a:solidFill>
+                <a:latin typeface="+mn-lt"/>
+                <a:ea typeface="+mn-ea"/>
+                <a:cs typeface="+mn-cs"/>
+              </a:rPr>
+              <a:t> = 299, seed = None, </a:t>
+            </a:r>
+            <a:r>
+              <a:rPr lang="en-US" sz="2000" kern="1200" dirty="0" err="1">
+                <a:solidFill>
+                  <a:srgbClr val="84C8D9"/>
+                </a:solidFill>
+                <a:latin typeface="+mn-lt"/>
+                <a:ea typeface="+mn-ea"/>
+                <a:cs typeface="+mn-cs"/>
+              </a:rPr>
+              <a:t>bin_seeding</a:t>
+            </a:r>
+            <a:r>
+              <a:rPr lang="en-US" sz="2000" kern="1200" dirty="0">
+                <a:solidFill>
+                  <a:srgbClr val="84C8D9"/>
+                </a:solidFill>
+                <a:latin typeface="+mn-lt"/>
+                <a:ea typeface="+mn-ea"/>
+                <a:cs typeface="+mn-cs"/>
+              </a:rPr>
+              <a:t>  = False, </a:t>
+            </a:r>
+            <a:r>
+              <a:rPr lang="en-US" sz="2000" kern="1200" dirty="0" err="1">
+                <a:solidFill>
+                  <a:srgbClr val="84C8D9"/>
+                </a:solidFill>
+                <a:latin typeface="+mn-lt"/>
+                <a:ea typeface="+mn-ea"/>
+                <a:cs typeface="+mn-cs"/>
+              </a:rPr>
+              <a:t>min_bin:freq</a:t>
+            </a:r>
+            <a:r>
+              <a:rPr lang="en-US" sz="2000" kern="1200" dirty="0">
+                <a:solidFill>
+                  <a:srgbClr val="84C8D9"/>
+                </a:solidFill>
+                <a:latin typeface="+mn-lt"/>
+                <a:ea typeface="+mn-ea"/>
+                <a:cs typeface="+mn-cs"/>
+              </a:rPr>
+              <a:t> = 1, </a:t>
+            </a:r>
+            <a:r>
+              <a:rPr lang="en-US" sz="2000" kern="1200" dirty="0" err="1">
+                <a:solidFill>
+                  <a:srgbClr val="84C8D9"/>
+                </a:solidFill>
+                <a:latin typeface="+mn-lt"/>
+                <a:ea typeface="+mn-ea"/>
+                <a:cs typeface="+mn-cs"/>
+              </a:rPr>
+              <a:t>cluster_all</a:t>
+            </a:r>
+            <a:r>
+              <a:rPr lang="en-US" sz="2000" kern="1200" dirty="0">
+                <a:solidFill>
+                  <a:srgbClr val="84C8D9"/>
+                </a:solidFill>
+                <a:latin typeface="+mn-lt"/>
+                <a:ea typeface="+mn-ea"/>
+                <a:cs typeface="+mn-cs"/>
+              </a:rPr>
+              <a:t> = True, </a:t>
+            </a:r>
+            <a:r>
+              <a:rPr lang="en-US" sz="2000" kern="1200" dirty="0" err="1">
+                <a:solidFill>
+                  <a:srgbClr val="84C8D9"/>
+                </a:solidFill>
+                <a:latin typeface="+mn-lt"/>
+                <a:ea typeface="+mn-ea"/>
+                <a:cs typeface="+mn-cs"/>
+              </a:rPr>
+              <a:t>max_iter</a:t>
+            </a:r>
+            <a:r>
+              <a:rPr lang="en-US" sz="2000" kern="1200" dirty="0">
+                <a:solidFill>
+                  <a:srgbClr val="84C8D9"/>
+                </a:solidFill>
+                <a:latin typeface="+mn-lt"/>
+                <a:ea typeface="+mn-ea"/>
+                <a:cs typeface="+mn-cs"/>
+              </a:rPr>
+              <a:t> = 300</a:t>
+            </a:r>
+          </a:p>
+        </p:txBody>
+      </p:sp>
     </p:spTree>
     <p:extLst>
       <p:ext uri="{BB962C8B-B14F-4D97-AF65-F5344CB8AC3E}">
-        <p14:creationId xmlns:p14="http://schemas.microsoft.com/office/powerpoint/2010/main" val="3415017412"/>
+        <p14:creationId xmlns:p14="http://schemas.microsoft.com/office/powerpoint/2010/main" val="3434309054"/>
       </p:ext>
     </p:extLst>
   </p:cSld>
@@ -5322,6 +5634,352 @@
                 <a:ea typeface="+mj-ea"/>
                 <a:cs typeface="+mj-cs"/>
               </a:rPr>
+              <a:t>DBSCAN</a:t>
+            </a:r>
+          </a:p>
+        </p:txBody>
+      </p:sp>
+      <p:cxnSp>
+        <p:nvCxnSpPr>
+          <p:cNvPr id="14" name="Straight Connector 13">
+            <a:extLst>
+              <a:ext uri="{FF2B5EF4-FFF2-40B4-BE49-F238E27FC236}">
+                <a16:creationId xmlns:a16="http://schemas.microsoft.com/office/drawing/2014/main" id="{A82415D3-DDE5-4D63-8CB3-23A5EC581B27}"/>
+              </a:ext>
+              <a:ext uri="{C183D7F6-B498-43B3-948B-1728B52AA6E4}">
+                <adec:decorative xmlns:adec="http://schemas.microsoft.com/office/drawing/2017/decorative" val="1"/>
+              </a:ext>
+            </a:extLst>
+          </p:cNvPr>
+          <p:cNvCxnSpPr>
+            <a:cxnSpLocks noGrp="1" noRot="1" noChangeAspect="1" noMove="1" noResize="1" noEditPoints="1" noAdjustHandles="1" noChangeArrowheads="1" noChangeShapeType="1"/>
+          </p:cNvCxnSpPr>
+          <p:nvPr>
+            <p:extLst>
+              <p:ext uri="{386F3935-93C4-4BCD-93E2-E3B085C9AB24}">
+                <p16:designElem xmlns:p16="http://schemas.microsoft.com/office/powerpoint/2015/main" val="1"/>
+              </p:ext>
+            </p:extLst>
+          </p:nvPr>
+        </p:nvCxnSpPr>
+        <p:spPr>
+          <a:xfrm>
+            <a:off x="4724400" y="1479733"/>
+            <a:ext cx="2743200" cy="0"/>
+          </a:xfrm>
+          <a:prstGeom prst="line">
+            <a:avLst/>
+          </a:prstGeom>
+          <a:ln w="19050">
+            <a:solidFill>
+              <a:schemeClr val="bg1">
+                <a:alpha val="75000"/>
+              </a:schemeClr>
+            </a:solidFill>
+          </a:ln>
+        </p:spPr>
+        <p:style>
+          <a:lnRef idx="1">
+            <a:schemeClr val="accent1"/>
+          </a:lnRef>
+          <a:fillRef idx="0">
+            <a:schemeClr val="accent1"/>
+          </a:fillRef>
+          <a:effectRef idx="0">
+            <a:schemeClr val="accent1"/>
+          </a:effectRef>
+          <a:fontRef idx="minor">
+            <a:schemeClr val="tx1"/>
+          </a:fontRef>
+        </p:style>
+      </p:cxnSp>
+      <p:cxnSp>
+        <p:nvCxnSpPr>
+          <p:cNvPr id="16" name="Straight Connector 15">
+            <a:extLst>
+              <a:ext uri="{FF2B5EF4-FFF2-40B4-BE49-F238E27FC236}">
+                <a16:creationId xmlns:a16="http://schemas.microsoft.com/office/drawing/2014/main" id="{AD7193FB-6AE6-4B3B-8F89-56B55DD63B4D}"/>
+              </a:ext>
+              <a:ext uri="{C183D7F6-B498-43B3-948B-1728B52AA6E4}">
+                <adec:decorative xmlns:adec="http://schemas.microsoft.com/office/drawing/2017/decorative" val="1"/>
+              </a:ext>
+            </a:extLst>
+          </p:cNvPr>
+          <p:cNvCxnSpPr>
+            <a:cxnSpLocks noGrp="1" noRot="1" noChangeAspect="1" noMove="1" noResize="1" noEditPoints="1" noAdjustHandles="1" noChangeArrowheads="1" noChangeShapeType="1"/>
+          </p:cNvCxnSpPr>
+          <p:nvPr>
+            <p:extLst>
+              <p:ext uri="{386F3935-93C4-4BCD-93E2-E3B085C9AB24}">
+                <p16:designElem xmlns:p16="http://schemas.microsoft.com/office/powerpoint/2015/main" val="1"/>
+              </p:ext>
+            </p:extLst>
+          </p:nvPr>
+        </p:nvCxnSpPr>
+        <p:spPr bwMode="white">
+          <a:xfrm>
+            <a:off x="0" y="2201402"/>
+            <a:ext cx="12188824" cy="0"/>
+          </a:xfrm>
+          <a:prstGeom prst="line">
+            <a:avLst/>
+          </a:prstGeom>
+          <a:ln w="50800">
+            <a:solidFill>
+              <a:schemeClr val="tx1">
+                <a:lumMod val="75000"/>
+                <a:lumOff val="25000"/>
+              </a:schemeClr>
+            </a:solidFill>
+          </a:ln>
+        </p:spPr>
+        <p:style>
+          <a:lnRef idx="1">
+            <a:schemeClr val="accent1"/>
+          </a:lnRef>
+          <a:fillRef idx="0">
+            <a:schemeClr val="accent1"/>
+          </a:fillRef>
+          <a:effectRef idx="0">
+            <a:schemeClr val="accent1"/>
+          </a:effectRef>
+          <a:fontRef idx="minor">
+            <a:schemeClr val="tx1"/>
+          </a:fontRef>
+        </p:style>
+      </p:cxnSp>
+      <p:pic>
+        <p:nvPicPr>
+          <p:cNvPr id="11" name="Content Placeholder 10" descr="Graphical user interface, text&#10;&#10;Description automatically generated">
+            <a:extLst>
+              <a:ext uri="{FF2B5EF4-FFF2-40B4-BE49-F238E27FC236}">
+                <a16:creationId xmlns:a16="http://schemas.microsoft.com/office/drawing/2014/main" id="{29176373-59A0-D750-1D29-096ED3DFF72E}"/>
+              </a:ext>
+            </a:extLst>
+          </p:cNvPr>
+          <p:cNvPicPr>
+            <a:picLocks noGrp="1" noChangeAspect="1"/>
+          </p:cNvPicPr>
+          <p:nvPr>
+            <p:ph idx="1"/>
+          </p:nvPr>
+        </p:nvPicPr>
+        <p:blipFill>
+          <a:blip r:embed="rId2">
+            <a:extLst>
+              <a:ext uri="{28A0092B-C50C-407E-A947-70E740481C1C}">
+                <a14:useLocalDpi xmlns:a14="http://schemas.microsoft.com/office/drawing/2010/main" val="0"/>
+              </a:ext>
+            </a:extLst>
+          </a:blip>
+          <a:stretch>
+            <a:fillRect/>
+          </a:stretch>
+        </p:blipFill>
+        <p:spPr>
+          <a:xfrm>
+            <a:off x="345212" y="2691449"/>
+            <a:ext cx="11498400" cy="3171506"/>
+          </a:xfrm>
+        </p:spPr>
+      </p:pic>
+    </p:spTree>
+    <p:extLst>
+      <p:ext uri="{BB962C8B-B14F-4D97-AF65-F5344CB8AC3E}">
+        <p14:creationId xmlns:p14="http://schemas.microsoft.com/office/powerpoint/2010/main" val="3415017412"/>
+      </p:ext>
+    </p:extLst>
+  </p:cSld>
+  <p:clrMapOvr>
+    <a:masterClrMapping/>
+  </p:clrMapOvr>
+</p:sld>
+</file>
+
+<file path=ppt/slides/slide8.xml><?xml version="1.0" encoding="utf-8"?>
+<p:sld xmlns:a="http://schemas.openxmlformats.org/drawingml/2006/main" xmlns:r="http://schemas.openxmlformats.org/officeDocument/2006/relationships" xmlns:p="http://schemas.openxmlformats.org/presentationml/2006/main">
+  <p:cSld>
+    <p:bg>
+      <p:bgPr>
+        <a:solidFill>
+          <a:schemeClr val="bg1"/>
+        </a:solidFill>
+        <a:effectLst/>
+      </p:bgPr>
+    </p:bg>
+    <p:spTree>
+      <p:nvGrpSpPr>
+        <p:cNvPr id="1" name=""/>
+        <p:cNvGrpSpPr/>
+        <p:nvPr/>
+      </p:nvGrpSpPr>
+      <p:grpSpPr>
+        <a:xfrm>
+          <a:off x="0" y="0"/>
+          <a:ext cx="0" cy="0"/>
+          <a:chOff x="0" y="0"/>
+          <a:chExt cx="0" cy="0"/>
+        </a:xfrm>
+      </p:grpSpPr>
+      <p:cxnSp>
+        <p:nvCxnSpPr>
+          <p:cNvPr id="10" name="Straight Connector 9">
+            <a:extLst>
+              <a:ext uri="{FF2B5EF4-FFF2-40B4-BE49-F238E27FC236}">
+                <a16:creationId xmlns:a16="http://schemas.microsoft.com/office/drawing/2014/main" id="{D2E961F1-4A28-4A5F-BBD4-6E400E5E6C75}"/>
+              </a:ext>
+              <a:ext uri="{C183D7F6-B498-43B3-948B-1728B52AA6E4}">
+                <adec:decorative xmlns:adec="http://schemas.microsoft.com/office/drawing/2017/decorative" val="1"/>
+              </a:ext>
+            </a:extLst>
+          </p:cNvPr>
+          <p:cNvCxnSpPr>
+            <a:cxnSpLocks noGrp="1" noRot="1" noChangeAspect="1" noMove="1" noResize="1" noEditPoints="1" noAdjustHandles="1" noChangeArrowheads="1" noChangeShapeType="1"/>
+          </p:cNvCxnSpPr>
+          <p:nvPr>
+            <p:extLst>
+              <p:ext uri="{386F3935-93C4-4BCD-93E2-E3B085C9AB24}">
+                <p16:designElem xmlns:p16="http://schemas.microsoft.com/office/powerpoint/2015/main" val="1"/>
+              </p:ext>
+            </p:extLst>
+          </p:nvPr>
+        </p:nvCxnSpPr>
+        <p:spPr bwMode="white">
+          <a:xfrm>
+            <a:off x="0" y="272357"/>
+            <a:ext cx="12188824" cy="0"/>
+          </a:xfrm>
+          <a:prstGeom prst="line">
+            <a:avLst/>
+          </a:prstGeom>
+          <a:ln w="50800">
+            <a:solidFill>
+              <a:schemeClr val="tx1">
+                <a:lumMod val="75000"/>
+                <a:lumOff val="25000"/>
+              </a:schemeClr>
+            </a:solidFill>
+          </a:ln>
+        </p:spPr>
+        <p:style>
+          <a:lnRef idx="1">
+            <a:schemeClr val="accent1"/>
+          </a:lnRef>
+          <a:fillRef idx="0">
+            <a:schemeClr val="accent1"/>
+          </a:fillRef>
+          <a:effectRef idx="0">
+            <a:schemeClr val="accent1"/>
+          </a:effectRef>
+          <a:fontRef idx="minor">
+            <a:schemeClr val="tx1"/>
+          </a:fontRef>
+        </p:style>
+      </p:cxnSp>
+      <p:sp>
+        <p:nvSpPr>
+          <p:cNvPr id="12" name="Rectangle 11">
+            <a:extLst>
+              <a:ext uri="{FF2B5EF4-FFF2-40B4-BE49-F238E27FC236}">
+                <a16:creationId xmlns:a16="http://schemas.microsoft.com/office/drawing/2014/main" id="{7F57BEA8-497D-4AA8-8A18-BDCD696B25FE}"/>
+              </a:ext>
+              <a:ext uri="{C183D7F6-B498-43B3-948B-1728B52AA6E4}">
+                <adec:decorative xmlns:adec="http://schemas.microsoft.com/office/drawing/2017/decorative" val="1"/>
+              </a:ext>
+            </a:extLst>
+          </p:cNvPr>
+          <p:cNvSpPr>
+            <a:spLocks noGrp="1" noRot="1" noChangeAspect="1" noMove="1" noResize="1" noEditPoints="1" noAdjustHandles="1" noChangeArrowheads="1" noChangeShapeType="1" noTextEdit="1"/>
+          </p:cNvSpPr>
+          <p:nvPr>
+            <p:extLst>
+              <p:ext uri="{386F3935-93C4-4BCD-93E2-E3B085C9AB24}">
+                <p16:designElem xmlns:p16="http://schemas.microsoft.com/office/powerpoint/2015/main" val="1"/>
+              </p:ext>
+            </p:extLst>
+          </p:nvPr>
+        </p:nvSpPr>
+        <p:spPr>
+          <a:xfrm>
+            <a:off x="0" y="368596"/>
+            <a:ext cx="12192000" cy="1735555"/>
+          </a:xfrm>
+          <a:prstGeom prst="rect">
+            <a:avLst/>
+          </a:prstGeom>
+          <a:solidFill>
+            <a:schemeClr val="tx1">
+              <a:lumMod val="75000"/>
+              <a:lumOff val="25000"/>
+            </a:schemeClr>
+          </a:solidFill>
+          <a:ln>
+            <a:noFill/>
+          </a:ln>
+        </p:spPr>
+        <p:style>
+          <a:lnRef idx="2">
+            <a:schemeClr val="accent1">
+              <a:shade val="50000"/>
+            </a:schemeClr>
+          </a:lnRef>
+          <a:fillRef idx="1">
+            <a:schemeClr val="accent1"/>
+          </a:fillRef>
+          <a:effectRef idx="0">
+            <a:schemeClr val="accent1"/>
+          </a:effectRef>
+          <a:fontRef idx="minor">
+            <a:schemeClr val="lt1"/>
+          </a:fontRef>
+        </p:style>
+        <p:txBody>
+          <a:bodyPr rtlCol="0" anchor="ctr"/>
+          <a:lstStyle/>
+          <a:p>
+            <a:pPr algn="ctr"/>
+            <a:endParaRPr lang="en-US"/>
+          </a:p>
+        </p:txBody>
+      </p:sp>
+      <p:sp>
+        <p:nvSpPr>
+          <p:cNvPr id="2" name="Title 1">
+            <a:extLst>
+              <a:ext uri="{FF2B5EF4-FFF2-40B4-BE49-F238E27FC236}">
+                <a16:creationId xmlns:a16="http://schemas.microsoft.com/office/drawing/2014/main" id="{9611DBBC-A346-AE5E-0070-13CDE0266B43}"/>
+              </a:ext>
+            </a:extLst>
+          </p:cNvPr>
+          <p:cNvSpPr>
+            <a:spLocks noGrp="1"/>
+          </p:cNvSpPr>
+          <p:nvPr>
+            <p:ph type="title"/>
+          </p:nvPr>
+        </p:nvSpPr>
+        <p:spPr>
+          <a:xfrm>
+            <a:off x="526073" y="489439"/>
+            <a:ext cx="11139854" cy="930447"/>
+          </a:xfrm>
+        </p:spPr>
+        <p:txBody>
+          <a:bodyPr vert="horz" lIns="91440" tIns="45720" rIns="91440" bIns="45720" rtlCol="0" anchor="b">
+            <a:normAutofit/>
+          </a:bodyPr>
+          <a:lstStyle/>
+          <a:p>
+            <a:pPr algn="ctr"/>
+            <a:r>
+              <a:rPr lang="en-US" sz="5400" kern="1200" dirty="0">
+                <a:solidFill>
+                  <a:schemeClr val="bg1"/>
+                </a:solidFill>
+                <a:latin typeface="+mj-lt"/>
+                <a:ea typeface="+mj-ea"/>
+                <a:cs typeface="+mj-cs"/>
+              </a:rPr>
               <a:t>Agglomerative </a:t>
             </a:r>
             <a:r>
@@ -5507,7 +6165,7 @@
 </p:sld>
 </file>
 
-<file path=ppt/slides/slide8.xml><?xml version="1.0" encoding="utf-8"?>
+<file path=ppt/slides/slide9.xml><?xml version="1.0" encoding="utf-8"?>
 <p:sld xmlns:a="http://schemas.openxmlformats.org/drawingml/2006/main" xmlns:r="http://schemas.openxmlformats.org/officeDocument/2006/relationships" xmlns:p="http://schemas.openxmlformats.org/presentationml/2006/main">
   <p:cSld>
     <p:bg>

</xml_diff>